<commit_message>
updated coding section with another image
</commit_message>
<xml_diff>
--- a/static/media/coding-timeline.pptx
+++ b/static/media/coding-timeline.pptx
@@ -9,16 +9,17 @@
   </p:notesMasterIdLst>
   <p:sldIdLst>
     <p:sldId id="256" r:id="rId6"/>
+    <p:sldId id="257" r:id="rId7"/>
   </p:sldIdLst>
   <p:sldSz cy="5143500" cx="9144000"/>
   <p:notesSz cx="6858000" cy="9144000"/>
   <p:embeddedFontLst>
     <p:embeddedFont>
       <p:font typeface="Montserrat"/>
-      <p:regular r:id="rId7"/>
-      <p:bold r:id="rId8"/>
-      <p:italic r:id="rId9"/>
-      <p:boldItalic r:id="rId10"/>
+      <p:regular r:id="rId8"/>
+      <p:bold r:id="rId9"/>
+      <p:italic r:id="rId10"/>
+      <p:boldItalic r:id="rId11"/>
     </p:embeddedFont>
   </p:embeddedFontLst>
   <p:defaultTextStyle>
@@ -750,6 +751,105 @@
       <p:sp>
         <p:nvSpPr>
           <p:cNvPr id="52" name="Google Shape;52;g232b796bd83_0_0:notes"/>
+          <p:cNvSpPr txBox="1"/>
+          <p:nvPr>
+            <p:ph idx="1" type="body"/>
+          </p:nvPr>
+        </p:nvSpPr>
+        <p:spPr>
+          <a:xfrm>
+            <a:off x="685800" y="4343400"/>
+            <a:ext cx="5486400" cy="4114800"/>
+          </a:xfrm>
+          <a:prstGeom prst="rect">
+            <a:avLst/>
+          </a:prstGeom>
+        </p:spPr>
+        <p:txBody>
+          <a:bodyPr anchorCtr="0" anchor="t" bIns="91425" lIns="91425" spcFirstLastPara="1" rIns="91425" wrap="square" tIns="91425">
+            <a:noAutofit/>
+          </a:bodyPr>
+          <a:lstStyle/>
+          <a:p>
+            <a:pPr indent="0" lvl="0" marL="0" rtl="0" algn="l">
+              <a:spcBef>
+                <a:spcPts val="0"/>
+              </a:spcBef>
+              <a:spcAft>
+                <a:spcPts val="0"/>
+              </a:spcAft>
+              <a:buNone/>
+            </a:pPr>
+            <a:r>
+              <a:t/>
+            </a:r>
+            <a:endParaRPr/>
+          </a:p>
+        </p:txBody>
+      </p:sp>
+    </p:spTree>
+  </p:cSld>
+  <p:clrMapOvr>
+    <a:masterClrMapping/>
+  </p:clrMapOvr>
+</p:notes>
+</file>
+
+<file path=ppt/notesSlides/notesSlide2.xml><?xml version="1.0" encoding="utf-8"?>
+<p:notes xmlns:a="http://schemas.openxmlformats.org/drawingml/2006/main" xmlns:r="http://schemas.openxmlformats.org/officeDocument/2006/relationships" xmlns:mc="http://schemas.openxmlformats.org/markup-compatibility/2006" xmlns:mv="urn:schemas-microsoft-com:mac:vml" xmlns:p="http://schemas.openxmlformats.org/presentationml/2006/main" xmlns:c="http://schemas.openxmlformats.org/drawingml/2006/chart" xmlns:dgm="http://schemas.openxmlformats.org/drawingml/2006/diagram" xmlns:o="urn:schemas-microsoft-com:office:office" xmlns:v="urn:schemas-microsoft-com:vml" xmlns:pvml="urn:schemas-microsoft-com:office:powerpoint" xmlns:com="http://schemas.openxmlformats.org/drawingml/2006/compatibility" xmlns:p14="http://schemas.microsoft.com/office/powerpoint/2010/main" xmlns:p15="http://schemas.microsoft.com/office/powerpoint/2012/main" xmlns:ahyp="http://schemas.microsoft.com/office/drawing/2018/hyperlinkcolor" showMasterPhAnim="0" showMasterSp="0">
+  <p:cSld>
+    <p:spTree>
+      <p:nvGrpSpPr>
+        <p:cNvPr id="85" name="Shape 85"/>
+        <p:cNvGrpSpPr/>
+        <p:nvPr/>
+      </p:nvGrpSpPr>
+      <p:grpSpPr>
+        <a:xfrm>
+          <a:off x="0" y="0"/>
+          <a:ext cx="0" cy="0"/>
+          <a:chOff x="0" y="0"/>
+          <a:chExt cx="0" cy="0"/>
+        </a:xfrm>
+      </p:grpSpPr>
+      <p:sp>
+        <p:nvSpPr>
+          <p:cNvPr id="86" name="Google Shape;86;g232b796bd83_0_79:notes"/>
+          <p:cNvSpPr/>
+          <p:nvPr>
+            <p:ph idx="2" type="sldImg"/>
+          </p:nvPr>
+        </p:nvSpPr>
+        <p:spPr>
+          <a:xfrm>
+            <a:off x="381300" y="685800"/>
+            <a:ext cx="6096000" cy="3429000"/>
+          </a:xfrm>
+          <a:custGeom>
+            <a:rect b="b" l="l" r="r" t="t"/>
+            <a:pathLst>
+              <a:path extrusionOk="0" h="120000" w="120000">
+                <a:moveTo>
+                  <a:pt x="0" y="0"/>
+                </a:moveTo>
+                <a:lnTo>
+                  <a:pt x="120000" y="0"/>
+                </a:lnTo>
+                <a:lnTo>
+                  <a:pt x="120000" y="120000"/>
+                </a:lnTo>
+                <a:lnTo>
+                  <a:pt x="0" y="120000"/>
+                </a:lnTo>
+                <a:close/>
+              </a:path>
+            </a:pathLst>
+          </a:custGeom>
+        </p:spPr>
+      </p:sp>
+      <p:sp>
+        <p:nvSpPr>
+          <p:cNvPr id="87" name="Google Shape;87;g232b796bd83_0_79:notes"/>
           <p:cNvSpPr txBox="1"/>
           <p:nvPr>
             <p:ph idx="1" type="body"/>
@@ -6901,7 +7001,2085 @@
 </p:sld>
 </file>
 
+<file path=ppt/slides/slide2.xml><?xml version="1.0" encoding="utf-8"?>
+<p:sld xmlns:a="http://schemas.openxmlformats.org/drawingml/2006/main" xmlns:r="http://schemas.openxmlformats.org/officeDocument/2006/relationships" xmlns:mc="http://schemas.openxmlformats.org/markup-compatibility/2006" xmlns:mv="urn:schemas-microsoft-com:mac:vml" xmlns:p="http://schemas.openxmlformats.org/presentationml/2006/main" xmlns:c="http://schemas.openxmlformats.org/drawingml/2006/chart" xmlns:dgm="http://schemas.openxmlformats.org/drawingml/2006/diagram" xmlns:o="urn:schemas-microsoft-com:office:office" xmlns:v="urn:schemas-microsoft-com:vml" xmlns:pvml="urn:schemas-microsoft-com:office:powerpoint" xmlns:com="http://schemas.openxmlformats.org/drawingml/2006/compatibility" xmlns:p14="http://schemas.microsoft.com/office/powerpoint/2010/main" xmlns:p15="http://schemas.microsoft.com/office/powerpoint/2012/main" xmlns:ahyp="http://schemas.microsoft.com/office/drawing/2018/hyperlinkcolor">
+  <p:cSld>
+    <p:spTree>
+      <p:nvGrpSpPr>
+        <p:cNvPr id="88" name="Shape 88"/>
+        <p:cNvGrpSpPr/>
+        <p:nvPr/>
+      </p:nvGrpSpPr>
+      <p:grpSpPr>
+        <a:xfrm>
+          <a:off x="0" y="0"/>
+          <a:ext cx="0" cy="0"/>
+          <a:chOff x="0" y="0"/>
+          <a:chExt cx="0" cy="0"/>
+        </a:xfrm>
+      </p:grpSpPr>
+      <p:sp>
+        <p:nvSpPr>
+          <p:cNvPr id="89" name="Google Shape;89;p14"/>
+          <p:cNvSpPr/>
+          <p:nvPr/>
+        </p:nvSpPr>
+        <p:spPr>
+          <a:xfrm>
+            <a:off x="8196563" y="4354988"/>
+            <a:ext cx="1179900" cy="1109700"/>
+          </a:xfrm>
+          <a:prstGeom prst="ellipse">
+            <a:avLst/>
+          </a:prstGeom>
+          <a:solidFill>
+            <a:schemeClr val="lt1"/>
+          </a:solidFill>
+          <a:ln cap="flat" cmpd="sng" w="9525">
+            <a:solidFill>
+              <a:schemeClr val="lt1"/>
+            </a:solidFill>
+            <a:prstDash val="solid"/>
+            <a:round/>
+            <a:headEnd len="sm" w="sm" type="none"/>
+            <a:tailEnd len="sm" w="sm" type="none"/>
+          </a:ln>
+        </p:spPr>
+        <p:txBody>
+          <a:bodyPr anchorCtr="0" anchor="ctr" bIns="91425" lIns="91425" spcFirstLastPara="1" rIns="91425" wrap="square" tIns="91425">
+            <a:noAutofit/>
+          </a:bodyPr>
+          <a:lstStyle/>
+          <a:p>
+            <a:pPr indent="0" lvl="0" marL="0" rtl="0" algn="l">
+              <a:spcBef>
+                <a:spcPts val="0"/>
+              </a:spcBef>
+              <a:spcAft>
+                <a:spcPts val="0"/>
+              </a:spcAft>
+              <a:buNone/>
+            </a:pPr>
+            <a:r>
+              <a:t/>
+            </a:r>
+            <a:endParaRPr/>
+          </a:p>
+        </p:txBody>
+      </p:sp>
+      <p:sp>
+        <p:nvSpPr>
+          <p:cNvPr id="90" name="Google Shape;90;p14"/>
+          <p:cNvSpPr txBox="1"/>
+          <p:nvPr/>
+        </p:nvSpPr>
+        <p:spPr>
+          <a:xfrm>
+            <a:off x="209550" y="142875"/>
+            <a:ext cx="5622000" cy="538800"/>
+          </a:xfrm>
+          <a:prstGeom prst="rect">
+            <a:avLst/>
+          </a:prstGeom>
+          <a:noFill/>
+          <a:ln>
+            <a:noFill/>
+          </a:ln>
+        </p:spPr>
+        <p:txBody>
+          <a:bodyPr anchorCtr="0" anchor="t" bIns="91425" lIns="91425" spcFirstLastPara="1" rIns="91425" wrap="square" tIns="91425">
+            <a:spAutoFit/>
+          </a:bodyPr>
+          <a:lstStyle/>
+          <a:p>
+            <a:pPr indent="0" lvl="0" marL="0" rtl="0" algn="l">
+              <a:spcBef>
+                <a:spcPts val="0"/>
+              </a:spcBef>
+              <a:spcAft>
+                <a:spcPts val="0"/>
+              </a:spcAft>
+              <a:buNone/>
+            </a:pPr>
+            <a:r>
+              <a:rPr b="1" lang="it" sz="2300">
+                <a:solidFill>
+                  <a:schemeClr val="lt1"/>
+                </a:solidFill>
+                <a:latin typeface="Montserrat"/>
+                <a:ea typeface="Montserrat"/>
+                <a:cs typeface="Montserrat"/>
+                <a:sym typeface="Montserrat"/>
+              </a:rPr>
+              <a:t>Technical Assessment timeline</a:t>
+            </a:r>
+            <a:endParaRPr b="1" sz="2300">
+              <a:solidFill>
+                <a:schemeClr val="lt1"/>
+              </a:solidFill>
+              <a:latin typeface="Montserrat"/>
+              <a:ea typeface="Montserrat"/>
+              <a:cs typeface="Montserrat"/>
+              <a:sym typeface="Montserrat"/>
+            </a:endParaRPr>
+          </a:p>
+        </p:txBody>
+      </p:sp>
+      <p:cxnSp>
+        <p:nvCxnSpPr>
+          <p:cNvPr id="91" name="Google Shape;91;p14"/>
+          <p:cNvCxnSpPr/>
+          <p:nvPr/>
+        </p:nvCxnSpPr>
+        <p:spPr>
+          <a:xfrm flipH="1" rot="10800000">
+            <a:off x="-143250" y="725850"/>
+            <a:ext cx="5195700" cy="8400"/>
+          </a:xfrm>
+          <a:prstGeom prst="straightConnector1">
+            <a:avLst/>
+          </a:prstGeom>
+          <a:noFill/>
+          <a:ln cap="flat" cmpd="sng" w="28575">
+            <a:solidFill>
+              <a:schemeClr val="lt1"/>
+            </a:solidFill>
+            <a:prstDash val="solid"/>
+            <a:round/>
+            <a:headEnd len="med" w="med" type="none"/>
+            <a:tailEnd len="med" w="med" type="none"/>
+          </a:ln>
+        </p:spPr>
+      </p:cxnSp>
+      <p:grpSp>
+        <p:nvGrpSpPr>
+          <p:cNvPr id="92" name="Google Shape;92;p14"/>
+          <p:cNvGrpSpPr/>
+          <p:nvPr/>
+        </p:nvGrpSpPr>
+        <p:grpSpPr>
+          <a:xfrm>
+            <a:off x="6919200" y="1047488"/>
+            <a:ext cx="1721400" cy="2421825"/>
+            <a:chOff x="836350" y="981075"/>
+            <a:chExt cx="1721400" cy="2421825"/>
+          </a:xfrm>
+        </p:grpSpPr>
+        <p:sp>
+          <p:nvSpPr>
+            <p:cNvPr id="93" name="Google Shape;93;p14"/>
+            <p:cNvSpPr/>
+            <p:nvPr/>
+          </p:nvSpPr>
+          <p:spPr>
+            <a:xfrm>
+              <a:off x="836350" y="1228500"/>
+              <a:ext cx="1721400" cy="2174400"/>
+            </a:xfrm>
+            <a:prstGeom prst="roundRect">
+              <a:avLst>
+                <a:gd fmla="val 16667" name="adj"/>
+              </a:avLst>
+            </a:prstGeom>
+            <a:solidFill>
+              <a:srgbClr val="FFFFFF"/>
+            </a:solidFill>
+            <a:ln cap="flat" cmpd="sng" w="38100">
+              <a:solidFill>
+                <a:srgbClr val="4A86E8"/>
+              </a:solidFill>
+              <a:prstDash val="solid"/>
+              <a:round/>
+              <a:headEnd len="sm" w="sm" type="none"/>
+              <a:tailEnd len="sm" w="sm" type="none"/>
+            </a:ln>
+          </p:spPr>
+          <p:txBody>
+            <a:bodyPr anchorCtr="0" anchor="ctr" bIns="91425" lIns="91425" spcFirstLastPara="1" rIns="91425" wrap="square" tIns="91425">
+              <a:noAutofit/>
+            </a:bodyPr>
+            <a:lstStyle/>
+            <a:p>
+              <a:pPr indent="0" lvl="0" marL="0" rtl="0" algn="l">
+                <a:spcBef>
+                  <a:spcPts val="0"/>
+                </a:spcBef>
+                <a:spcAft>
+                  <a:spcPts val="0"/>
+                </a:spcAft>
+                <a:buNone/>
+              </a:pPr>
+              <a:r>
+                <a:t/>
+              </a:r>
+              <a:endParaRPr/>
+            </a:p>
+          </p:txBody>
+        </p:sp>
+        <p:sp>
+          <p:nvSpPr>
+            <p:cNvPr id="94" name="Google Shape;94;p14"/>
+            <p:cNvSpPr/>
+            <p:nvPr/>
+          </p:nvSpPr>
+          <p:spPr>
+            <a:xfrm>
+              <a:off x="1461700" y="981075"/>
+              <a:ext cx="471600" cy="471600"/>
+            </a:xfrm>
+            <a:prstGeom prst="ellipse">
+              <a:avLst/>
+            </a:prstGeom>
+            <a:solidFill>
+              <a:srgbClr val="FFFFFF"/>
+            </a:solidFill>
+            <a:ln cap="flat" cmpd="sng" w="28575">
+              <a:solidFill>
+                <a:srgbClr val="4A86E8"/>
+              </a:solidFill>
+              <a:prstDash val="solid"/>
+              <a:round/>
+              <a:headEnd len="sm" w="sm" type="none"/>
+              <a:tailEnd len="sm" w="sm" type="none"/>
+            </a:ln>
+          </p:spPr>
+          <p:txBody>
+            <a:bodyPr anchorCtr="0" anchor="ctr" bIns="91425" lIns="91425" spcFirstLastPara="1" rIns="91425" wrap="square" tIns="91425">
+              <a:noAutofit/>
+            </a:bodyPr>
+            <a:lstStyle/>
+            <a:p>
+              <a:pPr indent="0" lvl="0" marL="0" rtl="0" algn="l">
+                <a:spcBef>
+                  <a:spcPts val="0"/>
+                </a:spcBef>
+                <a:spcAft>
+                  <a:spcPts val="0"/>
+                </a:spcAft>
+                <a:buNone/>
+              </a:pPr>
+              <a:r>
+                <a:t/>
+              </a:r>
+              <a:endParaRPr/>
+            </a:p>
+          </p:txBody>
+        </p:sp>
+        <p:sp>
+          <p:nvSpPr>
+            <p:cNvPr id="95" name="Google Shape;95;p14"/>
+            <p:cNvSpPr/>
+            <p:nvPr/>
+          </p:nvSpPr>
+          <p:spPr>
+            <a:xfrm>
+              <a:off x="1516300" y="1035525"/>
+              <a:ext cx="362400" cy="362700"/>
+            </a:xfrm>
+            <a:prstGeom prst="ellipse">
+              <a:avLst/>
+            </a:prstGeom>
+            <a:noFill/>
+            <a:ln cap="flat" cmpd="sng" w="28575">
+              <a:solidFill>
+                <a:srgbClr val="000000"/>
+              </a:solidFill>
+              <a:prstDash val="solid"/>
+              <a:round/>
+              <a:headEnd len="sm" w="sm" type="none"/>
+              <a:tailEnd len="sm" w="sm" type="none"/>
+            </a:ln>
+          </p:spPr>
+          <p:txBody>
+            <a:bodyPr anchorCtr="0" anchor="ctr" bIns="91425" lIns="91425" spcFirstLastPara="1" rIns="91425" wrap="square" tIns="91425">
+              <a:noAutofit/>
+            </a:bodyPr>
+            <a:lstStyle/>
+            <a:p>
+              <a:pPr indent="0" lvl="0" marL="0" rtl="0" algn="l">
+                <a:spcBef>
+                  <a:spcPts val="0"/>
+                </a:spcBef>
+                <a:spcAft>
+                  <a:spcPts val="0"/>
+                </a:spcAft>
+                <a:buNone/>
+              </a:pPr>
+              <a:r>
+                <a:t/>
+              </a:r>
+              <a:endParaRPr/>
+            </a:p>
+          </p:txBody>
+        </p:sp>
+      </p:grpSp>
+      <p:grpSp>
+        <p:nvGrpSpPr>
+          <p:cNvPr id="96" name="Google Shape;96;p14"/>
+          <p:cNvGrpSpPr/>
+          <p:nvPr/>
+        </p:nvGrpSpPr>
+        <p:grpSpPr>
+          <a:xfrm>
+            <a:off x="836350" y="1057275"/>
+            <a:ext cx="1721400" cy="2421825"/>
+            <a:chOff x="836350" y="981075"/>
+            <a:chExt cx="1721400" cy="2421825"/>
+          </a:xfrm>
+        </p:grpSpPr>
+        <p:sp>
+          <p:nvSpPr>
+            <p:cNvPr id="97" name="Google Shape;97;p14"/>
+            <p:cNvSpPr/>
+            <p:nvPr/>
+          </p:nvSpPr>
+          <p:spPr>
+            <a:xfrm>
+              <a:off x="836350" y="1228500"/>
+              <a:ext cx="1721400" cy="2174400"/>
+            </a:xfrm>
+            <a:prstGeom prst="roundRect">
+              <a:avLst>
+                <a:gd fmla="val 16667" name="adj"/>
+              </a:avLst>
+            </a:prstGeom>
+            <a:solidFill>
+              <a:srgbClr val="FFFFFF"/>
+            </a:solidFill>
+            <a:ln cap="flat" cmpd="sng" w="38100">
+              <a:solidFill>
+                <a:srgbClr val="4A86E8"/>
+              </a:solidFill>
+              <a:prstDash val="solid"/>
+              <a:round/>
+              <a:headEnd len="sm" w="sm" type="none"/>
+              <a:tailEnd len="sm" w="sm" type="none"/>
+            </a:ln>
+          </p:spPr>
+          <p:txBody>
+            <a:bodyPr anchorCtr="0" anchor="ctr" bIns="91425" lIns="91425" spcFirstLastPara="1" rIns="91425" wrap="square" tIns="91425">
+              <a:noAutofit/>
+            </a:bodyPr>
+            <a:lstStyle/>
+            <a:p>
+              <a:pPr indent="0" lvl="0" marL="0" rtl="0" algn="l">
+                <a:spcBef>
+                  <a:spcPts val="0"/>
+                </a:spcBef>
+                <a:spcAft>
+                  <a:spcPts val="0"/>
+                </a:spcAft>
+                <a:buNone/>
+              </a:pPr>
+              <a:r>
+                <a:t/>
+              </a:r>
+              <a:endParaRPr/>
+            </a:p>
+          </p:txBody>
+        </p:sp>
+        <p:sp>
+          <p:nvSpPr>
+            <p:cNvPr id="98" name="Google Shape;98;p14"/>
+            <p:cNvSpPr/>
+            <p:nvPr/>
+          </p:nvSpPr>
+          <p:spPr>
+            <a:xfrm>
+              <a:off x="1461700" y="981075"/>
+              <a:ext cx="471600" cy="471600"/>
+            </a:xfrm>
+            <a:prstGeom prst="ellipse">
+              <a:avLst/>
+            </a:prstGeom>
+            <a:solidFill>
+              <a:srgbClr val="FFFFFF"/>
+            </a:solidFill>
+            <a:ln cap="flat" cmpd="sng" w="28575">
+              <a:solidFill>
+                <a:srgbClr val="4A86E8"/>
+              </a:solidFill>
+              <a:prstDash val="solid"/>
+              <a:round/>
+              <a:headEnd len="sm" w="sm" type="none"/>
+              <a:tailEnd len="sm" w="sm" type="none"/>
+            </a:ln>
+          </p:spPr>
+          <p:txBody>
+            <a:bodyPr anchorCtr="0" anchor="ctr" bIns="91425" lIns="91425" spcFirstLastPara="1" rIns="91425" wrap="square" tIns="91425">
+              <a:noAutofit/>
+            </a:bodyPr>
+            <a:lstStyle/>
+            <a:p>
+              <a:pPr indent="0" lvl="0" marL="0" rtl="0" algn="l">
+                <a:spcBef>
+                  <a:spcPts val="0"/>
+                </a:spcBef>
+                <a:spcAft>
+                  <a:spcPts val="0"/>
+                </a:spcAft>
+                <a:buNone/>
+              </a:pPr>
+              <a:r>
+                <a:t/>
+              </a:r>
+              <a:endParaRPr/>
+            </a:p>
+          </p:txBody>
+        </p:sp>
+        <p:sp>
+          <p:nvSpPr>
+            <p:cNvPr id="99" name="Google Shape;99;p14"/>
+            <p:cNvSpPr/>
+            <p:nvPr/>
+          </p:nvSpPr>
+          <p:spPr>
+            <a:xfrm>
+              <a:off x="1516300" y="1035525"/>
+              <a:ext cx="362400" cy="362700"/>
+            </a:xfrm>
+            <a:prstGeom prst="ellipse">
+              <a:avLst/>
+            </a:prstGeom>
+            <a:noFill/>
+            <a:ln cap="flat" cmpd="sng" w="28575">
+              <a:solidFill>
+                <a:srgbClr val="000000"/>
+              </a:solidFill>
+              <a:prstDash val="solid"/>
+              <a:round/>
+              <a:headEnd len="sm" w="sm" type="none"/>
+              <a:tailEnd len="sm" w="sm" type="none"/>
+            </a:ln>
+          </p:spPr>
+          <p:txBody>
+            <a:bodyPr anchorCtr="0" anchor="ctr" bIns="91425" lIns="91425" spcFirstLastPara="1" rIns="91425" wrap="square" tIns="91425">
+              <a:noAutofit/>
+            </a:bodyPr>
+            <a:lstStyle/>
+            <a:p>
+              <a:pPr indent="0" lvl="0" marL="0" rtl="0" algn="l">
+                <a:spcBef>
+                  <a:spcPts val="0"/>
+                </a:spcBef>
+                <a:spcAft>
+                  <a:spcPts val="0"/>
+                </a:spcAft>
+                <a:buNone/>
+              </a:pPr>
+              <a:r>
+                <a:t/>
+              </a:r>
+              <a:endParaRPr/>
+            </a:p>
+          </p:txBody>
+        </p:sp>
+      </p:grpSp>
+      <p:sp>
+        <p:nvSpPr>
+          <p:cNvPr id="100" name="Google Shape;100;p14"/>
+          <p:cNvSpPr txBox="1"/>
+          <p:nvPr/>
+        </p:nvSpPr>
+        <p:spPr>
+          <a:xfrm>
+            <a:off x="533200" y="1572225"/>
+            <a:ext cx="2328600" cy="693000"/>
+          </a:xfrm>
+          <a:prstGeom prst="rect">
+            <a:avLst/>
+          </a:prstGeom>
+          <a:noFill/>
+          <a:ln>
+            <a:noFill/>
+          </a:ln>
+        </p:spPr>
+        <p:txBody>
+          <a:bodyPr anchorCtr="0" anchor="t" bIns="91425" lIns="91425" spcFirstLastPara="1" rIns="91425" wrap="square" tIns="91425">
+            <a:noAutofit/>
+          </a:bodyPr>
+          <a:lstStyle/>
+          <a:p>
+            <a:pPr indent="0" lvl="0" marL="0" rtl="0" algn="ctr">
+              <a:spcBef>
+                <a:spcPts val="0"/>
+              </a:spcBef>
+              <a:spcAft>
+                <a:spcPts val="0"/>
+              </a:spcAft>
+              <a:buNone/>
+            </a:pPr>
+            <a:r>
+              <a:rPr b="1" lang="it" sz="1800">
+                <a:latin typeface="Montserrat"/>
+                <a:ea typeface="Montserrat"/>
+                <a:cs typeface="Montserrat"/>
+                <a:sym typeface="Montserrat"/>
+              </a:rPr>
+              <a:t>Problem </a:t>
+            </a:r>
+            <a:endParaRPr b="1" sz="1800">
+              <a:latin typeface="Montserrat"/>
+              <a:ea typeface="Montserrat"/>
+              <a:cs typeface="Montserrat"/>
+              <a:sym typeface="Montserrat"/>
+            </a:endParaRPr>
+          </a:p>
+          <a:p>
+            <a:pPr indent="0" lvl="0" marL="0" rtl="0" algn="ctr">
+              <a:spcBef>
+                <a:spcPts val="0"/>
+              </a:spcBef>
+              <a:spcAft>
+                <a:spcPts val="0"/>
+              </a:spcAft>
+              <a:buNone/>
+            </a:pPr>
+            <a:r>
+              <a:rPr b="1" lang="it" sz="1800">
+                <a:latin typeface="Montserrat"/>
+                <a:ea typeface="Montserrat"/>
+                <a:cs typeface="Montserrat"/>
+                <a:sym typeface="Montserrat"/>
+              </a:rPr>
+              <a:t>Analysis</a:t>
+            </a:r>
+            <a:endParaRPr b="1" sz="1800">
+              <a:latin typeface="Montserrat"/>
+              <a:ea typeface="Montserrat"/>
+              <a:cs typeface="Montserrat"/>
+              <a:sym typeface="Montserrat"/>
+            </a:endParaRPr>
+          </a:p>
+        </p:txBody>
+      </p:sp>
+      <p:cxnSp>
+        <p:nvCxnSpPr>
+          <p:cNvPr id="101" name="Google Shape;101;p14"/>
+          <p:cNvCxnSpPr/>
+          <p:nvPr/>
+        </p:nvCxnSpPr>
+        <p:spPr>
+          <a:xfrm flipH="1" rot="10800000">
+            <a:off x="1032550" y="2454500"/>
+            <a:ext cx="1329900" cy="2100"/>
+          </a:xfrm>
+          <a:prstGeom prst="straightConnector1">
+            <a:avLst/>
+          </a:prstGeom>
+          <a:noFill/>
+          <a:ln cap="flat" cmpd="sng" w="28575">
+            <a:solidFill>
+              <a:srgbClr val="4A86E8"/>
+            </a:solidFill>
+            <a:prstDash val="solid"/>
+            <a:round/>
+            <a:headEnd len="med" w="med" type="diamond"/>
+            <a:tailEnd len="med" w="med" type="diamond"/>
+          </a:ln>
+        </p:spPr>
+      </p:cxnSp>
+      <p:pic>
+        <p:nvPicPr>
+          <p:cNvPr id="102" name="Google Shape;102;p14"/>
+          <p:cNvPicPr preferRelativeResize="0"/>
+          <p:nvPr/>
+        </p:nvPicPr>
+        <p:blipFill>
+          <a:blip r:embed="rId3">
+            <a:alphaModFix/>
+          </a:blip>
+          <a:stretch>
+            <a:fillRect/>
+          </a:stretch>
+        </p:blipFill>
+        <p:spPr>
+          <a:xfrm>
+            <a:off x="1432650" y="2526400"/>
+            <a:ext cx="529700" cy="529700"/>
+          </a:xfrm>
+          <a:prstGeom prst="rect">
+            <a:avLst/>
+          </a:prstGeom>
+          <a:noFill/>
+          <a:ln>
+            <a:noFill/>
+          </a:ln>
+        </p:spPr>
+      </p:pic>
+      <p:sp>
+        <p:nvSpPr>
+          <p:cNvPr id="103" name="Google Shape;103;p14"/>
+          <p:cNvSpPr txBox="1"/>
+          <p:nvPr/>
+        </p:nvSpPr>
+        <p:spPr>
+          <a:xfrm>
+            <a:off x="494650" y="3010150"/>
+            <a:ext cx="2328600" cy="393600"/>
+          </a:xfrm>
+          <a:prstGeom prst="rect">
+            <a:avLst/>
+          </a:prstGeom>
+          <a:noFill/>
+          <a:ln>
+            <a:noFill/>
+          </a:ln>
+        </p:spPr>
+        <p:txBody>
+          <a:bodyPr anchorCtr="0" anchor="t" bIns="91425" lIns="91425" spcFirstLastPara="1" rIns="91425" wrap="square" tIns="91425">
+            <a:noAutofit/>
+          </a:bodyPr>
+          <a:lstStyle/>
+          <a:p>
+            <a:pPr indent="0" lvl="0" marL="0" rtl="0" algn="ctr">
+              <a:spcBef>
+                <a:spcPts val="0"/>
+              </a:spcBef>
+              <a:spcAft>
+                <a:spcPts val="0"/>
+              </a:spcAft>
+              <a:buNone/>
+            </a:pPr>
+            <a:r>
+              <a:rPr b="1" lang="it" sz="1800">
+                <a:latin typeface="Montserrat"/>
+                <a:ea typeface="Montserrat"/>
+                <a:cs typeface="Montserrat"/>
+                <a:sym typeface="Montserrat"/>
+              </a:rPr>
+              <a:t>5 Mins</a:t>
+            </a:r>
+            <a:endParaRPr b="1" sz="1800">
+              <a:latin typeface="Montserrat"/>
+              <a:ea typeface="Montserrat"/>
+              <a:cs typeface="Montserrat"/>
+              <a:sym typeface="Montserrat"/>
+            </a:endParaRPr>
+          </a:p>
+        </p:txBody>
+      </p:sp>
+      <p:sp>
+        <p:nvSpPr>
+          <p:cNvPr id="104" name="Google Shape;104;p14"/>
+          <p:cNvSpPr txBox="1"/>
+          <p:nvPr/>
+        </p:nvSpPr>
+        <p:spPr>
+          <a:xfrm>
+            <a:off x="1530700" y="1057275"/>
+            <a:ext cx="333600" cy="393600"/>
+          </a:xfrm>
+          <a:prstGeom prst="rect">
+            <a:avLst/>
+          </a:prstGeom>
+          <a:noFill/>
+          <a:ln>
+            <a:noFill/>
+          </a:ln>
+        </p:spPr>
+        <p:txBody>
+          <a:bodyPr anchorCtr="0" anchor="t" bIns="91425" lIns="91425" spcFirstLastPara="1" rIns="91425" wrap="square" tIns="91425">
+            <a:noAutofit/>
+          </a:bodyPr>
+          <a:lstStyle/>
+          <a:p>
+            <a:pPr indent="0" lvl="0" marL="0" rtl="0" algn="ctr">
+              <a:spcBef>
+                <a:spcPts val="0"/>
+              </a:spcBef>
+              <a:spcAft>
+                <a:spcPts val="0"/>
+              </a:spcAft>
+              <a:buNone/>
+            </a:pPr>
+            <a:r>
+              <a:rPr b="1" lang="it" sz="1800">
+                <a:latin typeface="Montserrat"/>
+                <a:ea typeface="Montserrat"/>
+                <a:cs typeface="Montserrat"/>
+                <a:sym typeface="Montserrat"/>
+              </a:rPr>
+              <a:t>1</a:t>
+            </a:r>
+            <a:endParaRPr b="1" sz="1800">
+              <a:latin typeface="Montserrat"/>
+              <a:ea typeface="Montserrat"/>
+              <a:cs typeface="Montserrat"/>
+              <a:sym typeface="Montserrat"/>
+            </a:endParaRPr>
+          </a:p>
+        </p:txBody>
+      </p:sp>
+      <p:sp>
+        <p:nvSpPr>
+          <p:cNvPr id="105" name="Google Shape;105;p14"/>
+          <p:cNvSpPr txBox="1"/>
+          <p:nvPr/>
+        </p:nvSpPr>
+        <p:spPr>
+          <a:xfrm>
+            <a:off x="6577950" y="1577075"/>
+            <a:ext cx="2328600" cy="693000"/>
+          </a:xfrm>
+          <a:prstGeom prst="rect">
+            <a:avLst/>
+          </a:prstGeom>
+          <a:noFill/>
+          <a:ln>
+            <a:noFill/>
+          </a:ln>
+        </p:spPr>
+        <p:txBody>
+          <a:bodyPr anchorCtr="0" anchor="t" bIns="91425" lIns="91425" spcFirstLastPara="1" rIns="91425" wrap="square" tIns="91425">
+            <a:noAutofit/>
+          </a:bodyPr>
+          <a:lstStyle/>
+          <a:p>
+            <a:pPr indent="0" lvl="0" marL="0" rtl="0" algn="ctr">
+              <a:spcBef>
+                <a:spcPts val="0"/>
+              </a:spcBef>
+              <a:spcAft>
+                <a:spcPts val="0"/>
+              </a:spcAft>
+              <a:buNone/>
+            </a:pPr>
+            <a:r>
+              <a:rPr b="1" lang="it" sz="1800">
+                <a:latin typeface="Montserrat"/>
+                <a:ea typeface="Montserrat"/>
+                <a:cs typeface="Montserrat"/>
+                <a:sym typeface="Montserrat"/>
+              </a:rPr>
+              <a:t>Testing &amp;</a:t>
+            </a:r>
+            <a:endParaRPr b="1" sz="1800">
+              <a:latin typeface="Montserrat"/>
+              <a:ea typeface="Montserrat"/>
+              <a:cs typeface="Montserrat"/>
+              <a:sym typeface="Montserrat"/>
+            </a:endParaRPr>
+          </a:p>
+          <a:p>
+            <a:pPr indent="0" lvl="0" marL="0" rtl="0" algn="ctr">
+              <a:spcBef>
+                <a:spcPts val="0"/>
+              </a:spcBef>
+              <a:spcAft>
+                <a:spcPts val="0"/>
+              </a:spcAft>
+              <a:buNone/>
+            </a:pPr>
+            <a:r>
+              <a:rPr b="1" lang="it" sz="1800">
+                <a:latin typeface="Montserrat"/>
+                <a:ea typeface="Montserrat"/>
+                <a:cs typeface="Montserrat"/>
+                <a:sym typeface="Montserrat"/>
+              </a:rPr>
+              <a:t>Bug fixing</a:t>
+            </a:r>
+            <a:endParaRPr b="1" sz="1800">
+              <a:latin typeface="Montserrat"/>
+              <a:ea typeface="Montserrat"/>
+              <a:cs typeface="Montserrat"/>
+              <a:sym typeface="Montserrat"/>
+            </a:endParaRPr>
+          </a:p>
+        </p:txBody>
+      </p:sp>
+      <p:cxnSp>
+        <p:nvCxnSpPr>
+          <p:cNvPr id="106" name="Google Shape;106;p14"/>
+          <p:cNvCxnSpPr/>
+          <p:nvPr/>
+        </p:nvCxnSpPr>
+        <p:spPr>
+          <a:xfrm>
+            <a:off x="7163445" y="2450688"/>
+            <a:ext cx="1227000" cy="0"/>
+          </a:xfrm>
+          <a:prstGeom prst="straightConnector1">
+            <a:avLst/>
+          </a:prstGeom>
+          <a:noFill/>
+          <a:ln cap="flat" cmpd="sng" w="28575">
+            <a:solidFill>
+              <a:srgbClr val="4A86E8"/>
+            </a:solidFill>
+            <a:prstDash val="solid"/>
+            <a:round/>
+            <a:headEnd len="med" w="med" type="diamond"/>
+            <a:tailEnd len="med" w="med" type="diamond"/>
+          </a:ln>
+        </p:spPr>
+      </p:cxnSp>
+      <p:pic>
+        <p:nvPicPr>
+          <p:cNvPr id="107" name="Google Shape;107;p14"/>
+          <p:cNvPicPr preferRelativeResize="0"/>
+          <p:nvPr/>
+        </p:nvPicPr>
+        <p:blipFill>
+          <a:blip r:embed="rId3">
+            <a:alphaModFix/>
+          </a:blip>
+          <a:stretch>
+            <a:fillRect/>
+          </a:stretch>
+        </p:blipFill>
+        <p:spPr>
+          <a:xfrm>
+            <a:off x="7477400" y="2531250"/>
+            <a:ext cx="529700" cy="529700"/>
+          </a:xfrm>
+          <a:prstGeom prst="rect">
+            <a:avLst/>
+          </a:prstGeom>
+          <a:noFill/>
+          <a:ln>
+            <a:noFill/>
+          </a:ln>
+        </p:spPr>
+      </p:pic>
+      <p:sp>
+        <p:nvSpPr>
+          <p:cNvPr id="108" name="Google Shape;108;p14"/>
+          <p:cNvSpPr txBox="1"/>
+          <p:nvPr/>
+        </p:nvSpPr>
+        <p:spPr>
+          <a:xfrm>
+            <a:off x="6539400" y="3015000"/>
+            <a:ext cx="2328600" cy="393600"/>
+          </a:xfrm>
+          <a:prstGeom prst="rect">
+            <a:avLst/>
+          </a:prstGeom>
+          <a:noFill/>
+          <a:ln>
+            <a:noFill/>
+          </a:ln>
+        </p:spPr>
+        <p:txBody>
+          <a:bodyPr anchorCtr="0" anchor="t" bIns="91425" lIns="91425" spcFirstLastPara="1" rIns="91425" wrap="square" tIns="91425">
+            <a:noAutofit/>
+          </a:bodyPr>
+          <a:lstStyle/>
+          <a:p>
+            <a:pPr indent="0" lvl="0" marL="0" rtl="0" algn="ctr">
+              <a:spcBef>
+                <a:spcPts val="0"/>
+              </a:spcBef>
+              <a:spcAft>
+                <a:spcPts val="0"/>
+              </a:spcAft>
+              <a:buNone/>
+            </a:pPr>
+            <a:r>
+              <a:rPr b="1" lang="it" sz="1800">
+                <a:latin typeface="Montserrat"/>
+                <a:ea typeface="Montserrat"/>
+                <a:cs typeface="Montserrat"/>
+                <a:sym typeface="Montserrat"/>
+              </a:rPr>
+              <a:t>5 Mins</a:t>
+            </a:r>
+            <a:endParaRPr b="1" sz="1800">
+              <a:latin typeface="Montserrat"/>
+              <a:ea typeface="Montserrat"/>
+              <a:cs typeface="Montserrat"/>
+              <a:sym typeface="Montserrat"/>
+            </a:endParaRPr>
+          </a:p>
+        </p:txBody>
+      </p:sp>
+      <p:sp>
+        <p:nvSpPr>
+          <p:cNvPr id="109" name="Google Shape;109;p14"/>
+          <p:cNvSpPr txBox="1"/>
+          <p:nvPr/>
+        </p:nvSpPr>
+        <p:spPr>
+          <a:xfrm>
+            <a:off x="7597150" y="1052400"/>
+            <a:ext cx="333600" cy="393600"/>
+          </a:xfrm>
+          <a:prstGeom prst="rect">
+            <a:avLst/>
+          </a:prstGeom>
+          <a:noFill/>
+          <a:ln>
+            <a:noFill/>
+          </a:ln>
+        </p:spPr>
+        <p:txBody>
+          <a:bodyPr anchorCtr="0" anchor="t" bIns="91425" lIns="91425" spcFirstLastPara="1" rIns="91425" wrap="square" tIns="91425">
+            <a:noAutofit/>
+          </a:bodyPr>
+          <a:lstStyle/>
+          <a:p>
+            <a:pPr indent="0" lvl="0" marL="0" rtl="0" algn="ctr">
+              <a:spcBef>
+                <a:spcPts val="0"/>
+              </a:spcBef>
+              <a:spcAft>
+                <a:spcPts val="0"/>
+              </a:spcAft>
+              <a:buNone/>
+            </a:pPr>
+            <a:r>
+              <a:rPr b="1" lang="it" sz="1800">
+                <a:latin typeface="Montserrat"/>
+                <a:ea typeface="Montserrat"/>
+                <a:cs typeface="Montserrat"/>
+                <a:sym typeface="Montserrat"/>
+              </a:rPr>
+              <a:t>4</a:t>
+            </a:r>
+            <a:endParaRPr b="1" sz="1800">
+              <a:latin typeface="Montserrat"/>
+              <a:ea typeface="Montserrat"/>
+              <a:cs typeface="Montserrat"/>
+              <a:sym typeface="Montserrat"/>
+            </a:endParaRPr>
+          </a:p>
+        </p:txBody>
+      </p:sp>
+      <p:cxnSp>
+        <p:nvCxnSpPr>
+          <p:cNvPr id="110" name="Google Shape;110;p14"/>
+          <p:cNvCxnSpPr/>
+          <p:nvPr/>
+        </p:nvCxnSpPr>
+        <p:spPr>
+          <a:xfrm flipH="1" rot="10800000">
+            <a:off x="940775" y="4255300"/>
+            <a:ext cx="7638300" cy="10500"/>
+          </a:xfrm>
+          <a:prstGeom prst="straightConnector1">
+            <a:avLst/>
+          </a:prstGeom>
+          <a:noFill/>
+          <a:ln cap="flat" cmpd="sng" w="76200">
+            <a:solidFill>
+              <a:schemeClr val="dk2"/>
+            </a:solidFill>
+            <a:prstDash val="solid"/>
+            <a:round/>
+            <a:headEnd len="med" w="med" type="triangle"/>
+            <a:tailEnd len="med" w="med" type="triangle"/>
+          </a:ln>
+        </p:spPr>
+      </p:cxnSp>
+      <p:sp>
+        <p:nvSpPr>
+          <p:cNvPr id="111" name="Google Shape;111;p14"/>
+          <p:cNvSpPr txBox="1"/>
+          <p:nvPr/>
+        </p:nvSpPr>
+        <p:spPr>
+          <a:xfrm>
+            <a:off x="3407700" y="4314300"/>
+            <a:ext cx="2328600" cy="393600"/>
+          </a:xfrm>
+          <a:prstGeom prst="rect">
+            <a:avLst/>
+          </a:prstGeom>
+          <a:noFill/>
+          <a:ln>
+            <a:noFill/>
+          </a:ln>
+        </p:spPr>
+        <p:txBody>
+          <a:bodyPr anchorCtr="0" anchor="t" bIns="91425" lIns="91425" spcFirstLastPara="1" rIns="91425" wrap="square" tIns="91425">
+            <a:noAutofit/>
+          </a:bodyPr>
+          <a:lstStyle/>
+          <a:p>
+            <a:pPr indent="0" lvl="0" marL="0" rtl="0" algn="ctr">
+              <a:spcBef>
+                <a:spcPts val="0"/>
+              </a:spcBef>
+              <a:spcAft>
+                <a:spcPts val="0"/>
+              </a:spcAft>
+              <a:buNone/>
+            </a:pPr>
+            <a:r>
+              <a:rPr b="1" lang="it" sz="3000">
+                <a:solidFill>
+                  <a:schemeClr val="dk1"/>
+                </a:solidFill>
+                <a:latin typeface="Montserrat"/>
+                <a:ea typeface="Montserrat"/>
+                <a:cs typeface="Montserrat"/>
+                <a:sym typeface="Montserrat"/>
+              </a:rPr>
+              <a:t>35 Mins</a:t>
+            </a:r>
+            <a:endParaRPr b="1" sz="3000">
+              <a:solidFill>
+                <a:schemeClr val="dk1"/>
+              </a:solidFill>
+              <a:latin typeface="Montserrat"/>
+              <a:ea typeface="Montserrat"/>
+              <a:cs typeface="Montserrat"/>
+              <a:sym typeface="Montserrat"/>
+            </a:endParaRPr>
+          </a:p>
+        </p:txBody>
+      </p:sp>
+      <p:grpSp>
+        <p:nvGrpSpPr>
+          <p:cNvPr id="112" name="Google Shape;112;p14"/>
+          <p:cNvGrpSpPr/>
+          <p:nvPr/>
+        </p:nvGrpSpPr>
+        <p:grpSpPr>
+          <a:xfrm>
+            <a:off x="2823250" y="1057263"/>
+            <a:ext cx="1721400" cy="2421825"/>
+            <a:chOff x="836350" y="981075"/>
+            <a:chExt cx="1721400" cy="2421825"/>
+          </a:xfrm>
+        </p:grpSpPr>
+        <p:sp>
+          <p:nvSpPr>
+            <p:cNvPr id="113" name="Google Shape;113;p14"/>
+            <p:cNvSpPr/>
+            <p:nvPr/>
+          </p:nvSpPr>
+          <p:spPr>
+            <a:xfrm>
+              <a:off x="836350" y="1228500"/>
+              <a:ext cx="1721400" cy="2174400"/>
+            </a:xfrm>
+            <a:prstGeom prst="roundRect">
+              <a:avLst>
+                <a:gd fmla="val 16667" name="adj"/>
+              </a:avLst>
+            </a:prstGeom>
+            <a:solidFill>
+              <a:srgbClr val="FFFFFF"/>
+            </a:solidFill>
+            <a:ln cap="flat" cmpd="sng" w="38100">
+              <a:solidFill>
+                <a:srgbClr val="4A86E8"/>
+              </a:solidFill>
+              <a:prstDash val="solid"/>
+              <a:round/>
+              <a:headEnd len="sm" w="sm" type="none"/>
+              <a:tailEnd len="sm" w="sm" type="none"/>
+            </a:ln>
+          </p:spPr>
+          <p:txBody>
+            <a:bodyPr anchorCtr="0" anchor="ctr" bIns="91425" lIns="91425" spcFirstLastPara="1" rIns="91425" wrap="square" tIns="91425">
+              <a:noAutofit/>
+            </a:bodyPr>
+            <a:lstStyle/>
+            <a:p>
+              <a:pPr indent="0" lvl="0" marL="0" rtl="0" algn="l">
+                <a:spcBef>
+                  <a:spcPts val="0"/>
+                </a:spcBef>
+                <a:spcAft>
+                  <a:spcPts val="0"/>
+                </a:spcAft>
+                <a:buNone/>
+              </a:pPr>
+              <a:r>
+                <a:t/>
+              </a:r>
+              <a:endParaRPr/>
+            </a:p>
+          </p:txBody>
+        </p:sp>
+        <p:sp>
+          <p:nvSpPr>
+            <p:cNvPr id="114" name="Google Shape;114;p14"/>
+            <p:cNvSpPr/>
+            <p:nvPr/>
+          </p:nvSpPr>
+          <p:spPr>
+            <a:xfrm>
+              <a:off x="1461700" y="981075"/>
+              <a:ext cx="471600" cy="471600"/>
+            </a:xfrm>
+            <a:prstGeom prst="ellipse">
+              <a:avLst/>
+            </a:prstGeom>
+            <a:solidFill>
+              <a:srgbClr val="FFFFFF"/>
+            </a:solidFill>
+            <a:ln cap="flat" cmpd="sng" w="28575">
+              <a:solidFill>
+                <a:srgbClr val="4A86E8"/>
+              </a:solidFill>
+              <a:prstDash val="solid"/>
+              <a:round/>
+              <a:headEnd len="sm" w="sm" type="none"/>
+              <a:tailEnd len="sm" w="sm" type="none"/>
+            </a:ln>
+          </p:spPr>
+          <p:txBody>
+            <a:bodyPr anchorCtr="0" anchor="ctr" bIns="91425" lIns="91425" spcFirstLastPara="1" rIns="91425" wrap="square" tIns="91425">
+              <a:noAutofit/>
+            </a:bodyPr>
+            <a:lstStyle/>
+            <a:p>
+              <a:pPr indent="0" lvl="0" marL="0" rtl="0" algn="l">
+                <a:spcBef>
+                  <a:spcPts val="0"/>
+                </a:spcBef>
+                <a:spcAft>
+                  <a:spcPts val="0"/>
+                </a:spcAft>
+                <a:buNone/>
+              </a:pPr>
+              <a:r>
+                <a:t/>
+              </a:r>
+              <a:endParaRPr/>
+            </a:p>
+          </p:txBody>
+        </p:sp>
+        <p:sp>
+          <p:nvSpPr>
+            <p:cNvPr id="115" name="Google Shape;115;p14"/>
+            <p:cNvSpPr/>
+            <p:nvPr/>
+          </p:nvSpPr>
+          <p:spPr>
+            <a:xfrm>
+              <a:off x="1516300" y="1035525"/>
+              <a:ext cx="362400" cy="362700"/>
+            </a:xfrm>
+            <a:prstGeom prst="ellipse">
+              <a:avLst/>
+            </a:prstGeom>
+            <a:noFill/>
+            <a:ln cap="flat" cmpd="sng" w="28575">
+              <a:solidFill>
+                <a:srgbClr val="000000"/>
+              </a:solidFill>
+              <a:prstDash val="solid"/>
+              <a:round/>
+              <a:headEnd len="sm" w="sm" type="none"/>
+              <a:tailEnd len="sm" w="sm" type="none"/>
+            </a:ln>
+          </p:spPr>
+          <p:txBody>
+            <a:bodyPr anchorCtr="0" anchor="ctr" bIns="91425" lIns="91425" spcFirstLastPara="1" rIns="91425" wrap="square" tIns="91425">
+              <a:noAutofit/>
+            </a:bodyPr>
+            <a:lstStyle/>
+            <a:p>
+              <a:pPr indent="0" lvl="0" marL="0" rtl="0" algn="l">
+                <a:spcBef>
+                  <a:spcPts val="0"/>
+                </a:spcBef>
+                <a:spcAft>
+                  <a:spcPts val="0"/>
+                </a:spcAft>
+                <a:buNone/>
+              </a:pPr>
+              <a:r>
+                <a:t/>
+              </a:r>
+              <a:endParaRPr/>
+            </a:p>
+          </p:txBody>
+        </p:sp>
+      </p:grpSp>
+      <p:grpSp>
+        <p:nvGrpSpPr>
+          <p:cNvPr id="116" name="Google Shape;116;p14"/>
+          <p:cNvGrpSpPr/>
+          <p:nvPr/>
+        </p:nvGrpSpPr>
+        <p:grpSpPr>
+          <a:xfrm>
+            <a:off x="4850975" y="1057275"/>
+            <a:ext cx="1721400" cy="2421825"/>
+            <a:chOff x="836350" y="981075"/>
+            <a:chExt cx="1721400" cy="2421825"/>
+          </a:xfrm>
+        </p:grpSpPr>
+        <p:sp>
+          <p:nvSpPr>
+            <p:cNvPr id="117" name="Google Shape;117;p14"/>
+            <p:cNvSpPr/>
+            <p:nvPr/>
+          </p:nvSpPr>
+          <p:spPr>
+            <a:xfrm>
+              <a:off x="836350" y="1228500"/>
+              <a:ext cx="1721400" cy="2174400"/>
+            </a:xfrm>
+            <a:prstGeom prst="roundRect">
+              <a:avLst>
+                <a:gd fmla="val 16667" name="adj"/>
+              </a:avLst>
+            </a:prstGeom>
+            <a:solidFill>
+              <a:srgbClr val="FFFFFF"/>
+            </a:solidFill>
+            <a:ln cap="flat" cmpd="sng" w="38100">
+              <a:solidFill>
+                <a:srgbClr val="4A86E8"/>
+              </a:solidFill>
+              <a:prstDash val="solid"/>
+              <a:round/>
+              <a:headEnd len="sm" w="sm" type="none"/>
+              <a:tailEnd len="sm" w="sm" type="none"/>
+            </a:ln>
+          </p:spPr>
+          <p:txBody>
+            <a:bodyPr anchorCtr="0" anchor="ctr" bIns="91425" lIns="91425" spcFirstLastPara="1" rIns="91425" wrap="square" tIns="91425">
+              <a:noAutofit/>
+            </a:bodyPr>
+            <a:lstStyle/>
+            <a:p>
+              <a:pPr indent="0" lvl="0" marL="0" rtl="0" algn="l">
+                <a:spcBef>
+                  <a:spcPts val="0"/>
+                </a:spcBef>
+                <a:spcAft>
+                  <a:spcPts val="0"/>
+                </a:spcAft>
+                <a:buNone/>
+              </a:pPr>
+              <a:r>
+                <a:t/>
+              </a:r>
+              <a:endParaRPr/>
+            </a:p>
+          </p:txBody>
+        </p:sp>
+        <p:sp>
+          <p:nvSpPr>
+            <p:cNvPr id="118" name="Google Shape;118;p14"/>
+            <p:cNvSpPr/>
+            <p:nvPr/>
+          </p:nvSpPr>
+          <p:spPr>
+            <a:xfrm>
+              <a:off x="1461700" y="981075"/>
+              <a:ext cx="471600" cy="471600"/>
+            </a:xfrm>
+            <a:prstGeom prst="ellipse">
+              <a:avLst/>
+            </a:prstGeom>
+            <a:solidFill>
+              <a:srgbClr val="FFFFFF"/>
+            </a:solidFill>
+            <a:ln cap="flat" cmpd="sng" w="28575">
+              <a:solidFill>
+                <a:srgbClr val="4A86E8"/>
+              </a:solidFill>
+              <a:prstDash val="solid"/>
+              <a:round/>
+              <a:headEnd len="sm" w="sm" type="none"/>
+              <a:tailEnd len="sm" w="sm" type="none"/>
+            </a:ln>
+          </p:spPr>
+          <p:txBody>
+            <a:bodyPr anchorCtr="0" anchor="ctr" bIns="91425" lIns="91425" spcFirstLastPara="1" rIns="91425" wrap="square" tIns="91425">
+              <a:noAutofit/>
+            </a:bodyPr>
+            <a:lstStyle/>
+            <a:p>
+              <a:pPr indent="0" lvl="0" marL="0" rtl="0" algn="l">
+                <a:spcBef>
+                  <a:spcPts val="0"/>
+                </a:spcBef>
+                <a:spcAft>
+                  <a:spcPts val="0"/>
+                </a:spcAft>
+                <a:buNone/>
+              </a:pPr>
+              <a:r>
+                <a:t/>
+              </a:r>
+              <a:endParaRPr/>
+            </a:p>
+          </p:txBody>
+        </p:sp>
+        <p:sp>
+          <p:nvSpPr>
+            <p:cNvPr id="119" name="Google Shape;119;p14"/>
+            <p:cNvSpPr/>
+            <p:nvPr/>
+          </p:nvSpPr>
+          <p:spPr>
+            <a:xfrm>
+              <a:off x="1516300" y="1035525"/>
+              <a:ext cx="362400" cy="362700"/>
+            </a:xfrm>
+            <a:prstGeom prst="ellipse">
+              <a:avLst/>
+            </a:prstGeom>
+            <a:noFill/>
+            <a:ln cap="flat" cmpd="sng" w="28575">
+              <a:solidFill>
+                <a:srgbClr val="000000"/>
+              </a:solidFill>
+              <a:prstDash val="solid"/>
+              <a:round/>
+              <a:headEnd len="sm" w="sm" type="none"/>
+              <a:tailEnd len="sm" w="sm" type="none"/>
+            </a:ln>
+          </p:spPr>
+          <p:txBody>
+            <a:bodyPr anchorCtr="0" anchor="ctr" bIns="91425" lIns="91425" spcFirstLastPara="1" rIns="91425" wrap="square" tIns="91425">
+              <a:noAutofit/>
+            </a:bodyPr>
+            <a:lstStyle/>
+            <a:p>
+              <a:pPr indent="0" lvl="0" marL="0" rtl="0" algn="l">
+                <a:spcBef>
+                  <a:spcPts val="0"/>
+                </a:spcBef>
+                <a:spcAft>
+                  <a:spcPts val="0"/>
+                </a:spcAft>
+                <a:buNone/>
+              </a:pPr>
+              <a:r>
+                <a:t/>
+              </a:r>
+              <a:endParaRPr/>
+            </a:p>
+          </p:txBody>
+        </p:sp>
+      </p:grpSp>
+      <p:sp>
+        <p:nvSpPr>
+          <p:cNvPr id="120" name="Google Shape;120;p14"/>
+          <p:cNvSpPr txBox="1"/>
+          <p:nvPr/>
+        </p:nvSpPr>
+        <p:spPr>
+          <a:xfrm>
+            <a:off x="3514288" y="1057275"/>
+            <a:ext cx="333600" cy="393600"/>
+          </a:xfrm>
+          <a:prstGeom prst="rect">
+            <a:avLst/>
+          </a:prstGeom>
+          <a:noFill/>
+          <a:ln>
+            <a:noFill/>
+          </a:ln>
+        </p:spPr>
+        <p:txBody>
+          <a:bodyPr anchorCtr="0" anchor="t" bIns="91425" lIns="91425" spcFirstLastPara="1" rIns="91425" wrap="square" tIns="91425">
+            <a:noAutofit/>
+          </a:bodyPr>
+          <a:lstStyle/>
+          <a:p>
+            <a:pPr indent="0" lvl="0" marL="0" rtl="0" algn="ctr">
+              <a:spcBef>
+                <a:spcPts val="0"/>
+              </a:spcBef>
+              <a:spcAft>
+                <a:spcPts val="0"/>
+              </a:spcAft>
+              <a:buNone/>
+            </a:pPr>
+            <a:r>
+              <a:rPr b="1" lang="it" sz="1800">
+                <a:latin typeface="Montserrat"/>
+                <a:ea typeface="Montserrat"/>
+                <a:cs typeface="Montserrat"/>
+                <a:sym typeface="Montserrat"/>
+              </a:rPr>
+              <a:t>2</a:t>
+            </a:r>
+            <a:endParaRPr b="1" sz="1800">
+              <a:latin typeface="Montserrat"/>
+              <a:ea typeface="Montserrat"/>
+              <a:cs typeface="Montserrat"/>
+              <a:sym typeface="Montserrat"/>
+            </a:endParaRPr>
+          </a:p>
+        </p:txBody>
+      </p:sp>
+      <p:sp>
+        <p:nvSpPr>
+          <p:cNvPr id="121" name="Google Shape;121;p14"/>
+          <p:cNvSpPr txBox="1"/>
+          <p:nvPr/>
+        </p:nvSpPr>
+        <p:spPr>
+          <a:xfrm>
+            <a:off x="5555713" y="1052400"/>
+            <a:ext cx="333600" cy="393600"/>
+          </a:xfrm>
+          <a:prstGeom prst="rect">
+            <a:avLst/>
+          </a:prstGeom>
+          <a:noFill/>
+          <a:ln>
+            <a:noFill/>
+          </a:ln>
+        </p:spPr>
+        <p:txBody>
+          <a:bodyPr anchorCtr="0" anchor="t" bIns="91425" lIns="91425" spcFirstLastPara="1" rIns="91425" wrap="square" tIns="91425">
+            <a:noAutofit/>
+          </a:bodyPr>
+          <a:lstStyle/>
+          <a:p>
+            <a:pPr indent="0" lvl="0" marL="0" rtl="0" algn="ctr">
+              <a:spcBef>
+                <a:spcPts val="0"/>
+              </a:spcBef>
+              <a:spcAft>
+                <a:spcPts val="0"/>
+              </a:spcAft>
+              <a:buNone/>
+            </a:pPr>
+            <a:r>
+              <a:rPr b="1" lang="it" sz="1800">
+                <a:latin typeface="Montserrat"/>
+                <a:ea typeface="Montserrat"/>
+                <a:cs typeface="Montserrat"/>
+                <a:sym typeface="Montserrat"/>
+              </a:rPr>
+              <a:t>3</a:t>
+            </a:r>
+            <a:endParaRPr b="1" sz="1800">
+              <a:latin typeface="Montserrat"/>
+              <a:ea typeface="Montserrat"/>
+              <a:cs typeface="Montserrat"/>
+              <a:sym typeface="Montserrat"/>
+            </a:endParaRPr>
+          </a:p>
+        </p:txBody>
+      </p:sp>
+      <p:sp>
+        <p:nvSpPr>
+          <p:cNvPr id="122" name="Google Shape;122;p14"/>
+          <p:cNvSpPr txBox="1"/>
+          <p:nvPr/>
+        </p:nvSpPr>
+        <p:spPr>
+          <a:xfrm>
+            <a:off x="2823225" y="1594525"/>
+            <a:ext cx="1721400" cy="693000"/>
+          </a:xfrm>
+          <a:prstGeom prst="rect">
+            <a:avLst/>
+          </a:prstGeom>
+          <a:noFill/>
+          <a:ln>
+            <a:noFill/>
+          </a:ln>
+        </p:spPr>
+        <p:txBody>
+          <a:bodyPr anchorCtr="0" anchor="t" bIns="91425" lIns="91425" spcFirstLastPara="1" rIns="91425" wrap="square" tIns="91425">
+            <a:noAutofit/>
+          </a:bodyPr>
+          <a:lstStyle/>
+          <a:p>
+            <a:pPr indent="0" lvl="0" marL="0" rtl="0" algn="ctr">
+              <a:spcBef>
+                <a:spcPts val="0"/>
+              </a:spcBef>
+              <a:spcAft>
+                <a:spcPts val="0"/>
+              </a:spcAft>
+              <a:buNone/>
+            </a:pPr>
+            <a:r>
+              <a:rPr b="1" lang="it" sz="1800">
+                <a:latin typeface="Montserrat"/>
+                <a:ea typeface="Montserrat"/>
+                <a:cs typeface="Montserrat"/>
+                <a:sym typeface="Montserrat"/>
+              </a:rPr>
+              <a:t>Iterative</a:t>
+            </a:r>
+            <a:br>
+              <a:rPr b="1" lang="it" sz="1800">
+                <a:latin typeface="Montserrat"/>
+                <a:ea typeface="Montserrat"/>
+                <a:cs typeface="Montserrat"/>
+                <a:sym typeface="Montserrat"/>
+              </a:rPr>
+            </a:br>
+            <a:r>
+              <a:rPr b="1" lang="it" sz="1800">
+                <a:latin typeface="Montserrat"/>
+                <a:ea typeface="Montserrat"/>
+                <a:cs typeface="Montserrat"/>
+                <a:sym typeface="Montserrat"/>
+              </a:rPr>
+              <a:t>Design</a:t>
+            </a:r>
+            <a:endParaRPr b="1" sz="1800">
+              <a:latin typeface="Montserrat"/>
+              <a:ea typeface="Montserrat"/>
+              <a:cs typeface="Montserrat"/>
+              <a:sym typeface="Montserrat"/>
+            </a:endParaRPr>
+          </a:p>
+        </p:txBody>
+      </p:sp>
+      <p:cxnSp>
+        <p:nvCxnSpPr>
+          <p:cNvPr id="123" name="Google Shape;123;p14"/>
+          <p:cNvCxnSpPr/>
+          <p:nvPr/>
+        </p:nvCxnSpPr>
+        <p:spPr>
+          <a:xfrm flipH="1" rot="10800000">
+            <a:off x="3052875" y="2457268"/>
+            <a:ext cx="1329900" cy="2100"/>
+          </a:xfrm>
+          <a:prstGeom prst="straightConnector1">
+            <a:avLst/>
+          </a:prstGeom>
+          <a:noFill/>
+          <a:ln cap="flat" cmpd="sng" w="28575">
+            <a:solidFill>
+              <a:srgbClr val="4A86E8"/>
+            </a:solidFill>
+            <a:prstDash val="solid"/>
+            <a:round/>
+            <a:headEnd len="med" w="med" type="diamond"/>
+            <a:tailEnd len="med" w="med" type="diamond"/>
+          </a:ln>
+        </p:spPr>
+      </p:cxnSp>
+      <p:pic>
+        <p:nvPicPr>
+          <p:cNvPr id="124" name="Google Shape;124;p14"/>
+          <p:cNvPicPr preferRelativeResize="0"/>
+          <p:nvPr/>
+        </p:nvPicPr>
+        <p:blipFill>
+          <a:blip r:embed="rId3">
+            <a:alphaModFix/>
+          </a:blip>
+          <a:stretch>
+            <a:fillRect/>
+          </a:stretch>
+        </p:blipFill>
+        <p:spPr>
+          <a:xfrm>
+            <a:off x="3452975" y="2548688"/>
+            <a:ext cx="529700" cy="529700"/>
+          </a:xfrm>
+          <a:prstGeom prst="rect">
+            <a:avLst/>
+          </a:prstGeom>
+          <a:noFill/>
+          <a:ln>
+            <a:noFill/>
+          </a:ln>
+        </p:spPr>
+      </p:pic>
+      <p:sp>
+        <p:nvSpPr>
+          <p:cNvPr id="125" name="Google Shape;125;p14"/>
+          <p:cNvSpPr txBox="1"/>
+          <p:nvPr/>
+        </p:nvSpPr>
+        <p:spPr>
+          <a:xfrm>
+            <a:off x="2514975" y="3032450"/>
+            <a:ext cx="2328600" cy="393600"/>
+          </a:xfrm>
+          <a:prstGeom prst="rect">
+            <a:avLst/>
+          </a:prstGeom>
+          <a:noFill/>
+          <a:ln>
+            <a:noFill/>
+          </a:ln>
+        </p:spPr>
+        <p:txBody>
+          <a:bodyPr anchorCtr="0" anchor="t" bIns="91425" lIns="91425" spcFirstLastPara="1" rIns="91425" wrap="square" tIns="91425">
+            <a:noAutofit/>
+          </a:bodyPr>
+          <a:lstStyle/>
+          <a:p>
+            <a:pPr indent="0" lvl="0" marL="0" rtl="0" algn="ctr">
+              <a:spcBef>
+                <a:spcPts val="0"/>
+              </a:spcBef>
+              <a:spcAft>
+                <a:spcPts val="0"/>
+              </a:spcAft>
+              <a:buNone/>
+            </a:pPr>
+            <a:r>
+              <a:rPr b="1" lang="it" sz="1800">
+                <a:latin typeface="Montserrat"/>
+                <a:ea typeface="Montserrat"/>
+                <a:cs typeface="Montserrat"/>
+                <a:sym typeface="Montserrat"/>
+              </a:rPr>
+              <a:t>10 Mins</a:t>
+            </a:r>
+            <a:endParaRPr b="1" sz="1800">
+              <a:latin typeface="Montserrat"/>
+              <a:ea typeface="Montserrat"/>
+              <a:cs typeface="Montserrat"/>
+              <a:sym typeface="Montserrat"/>
+            </a:endParaRPr>
+          </a:p>
+        </p:txBody>
+      </p:sp>
+      <p:sp>
+        <p:nvSpPr>
+          <p:cNvPr id="126" name="Google Shape;126;p14"/>
+          <p:cNvSpPr txBox="1"/>
+          <p:nvPr/>
+        </p:nvSpPr>
+        <p:spPr>
+          <a:xfrm>
+            <a:off x="4856675" y="1594525"/>
+            <a:ext cx="1721400" cy="693000"/>
+          </a:xfrm>
+          <a:prstGeom prst="rect">
+            <a:avLst/>
+          </a:prstGeom>
+          <a:noFill/>
+          <a:ln>
+            <a:noFill/>
+          </a:ln>
+        </p:spPr>
+        <p:txBody>
+          <a:bodyPr anchorCtr="0" anchor="ctr" bIns="91425" lIns="91425" spcFirstLastPara="1" rIns="91425" wrap="square" tIns="91425">
+            <a:noAutofit/>
+          </a:bodyPr>
+          <a:lstStyle/>
+          <a:p>
+            <a:pPr indent="0" lvl="0" marL="0" rtl="0" algn="ctr">
+              <a:spcBef>
+                <a:spcPts val="0"/>
+              </a:spcBef>
+              <a:spcAft>
+                <a:spcPts val="0"/>
+              </a:spcAft>
+              <a:buNone/>
+            </a:pPr>
+            <a:r>
+              <a:rPr b="1" lang="it" sz="1800">
+                <a:latin typeface="Montserrat"/>
+                <a:ea typeface="Montserrat"/>
+                <a:cs typeface="Montserrat"/>
+                <a:sym typeface="Montserrat"/>
+              </a:rPr>
+              <a:t>Coding</a:t>
+            </a:r>
+            <a:endParaRPr b="1" sz="1800">
+              <a:latin typeface="Montserrat"/>
+              <a:ea typeface="Montserrat"/>
+              <a:cs typeface="Montserrat"/>
+              <a:sym typeface="Montserrat"/>
+            </a:endParaRPr>
+          </a:p>
+        </p:txBody>
+      </p:sp>
+      <p:cxnSp>
+        <p:nvCxnSpPr>
+          <p:cNvPr id="127" name="Google Shape;127;p14"/>
+          <p:cNvCxnSpPr/>
+          <p:nvPr/>
+        </p:nvCxnSpPr>
+        <p:spPr>
+          <a:xfrm flipH="1" rot="10800000">
+            <a:off x="5042005" y="2457268"/>
+            <a:ext cx="1329900" cy="2100"/>
+          </a:xfrm>
+          <a:prstGeom prst="straightConnector1">
+            <a:avLst/>
+          </a:prstGeom>
+          <a:noFill/>
+          <a:ln cap="flat" cmpd="sng" w="28575">
+            <a:solidFill>
+              <a:srgbClr val="4A86E8"/>
+            </a:solidFill>
+            <a:prstDash val="solid"/>
+            <a:round/>
+            <a:headEnd len="med" w="med" type="diamond"/>
+            <a:tailEnd len="med" w="med" type="diamond"/>
+          </a:ln>
+        </p:spPr>
+      </p:cxnSp>
+      <p:pic>
+        <p:nvPicPr>
+          <p:cNvPr id="128" name="Google Shape;128;p14"/>
+          <p:cNvPicPr preferRelativeResize="0"/>
+          <p:nvPr/>
+        </p:nvPicPr>
+        <p:blipFill>
+          <a:blip r:embed="rId3">
+            <a:alphaModFix/>
+          </a:blip>
+          <a:stretch>
+            <a:fillRect/>
+          </a:stretch>
+        </p:blipFill>
+        <p:spPr>
+          <a:xfrm>
+            <a:off x="5510425" y="2548688"/>
+            <a:ext cx="529700" cy="529700"/>
+          </a:xfrm>
+          <a:prstGeom prst="rect">
+            <a:avLst/>
+          </a:prstGeom>
+          <a:noFill/>
+          <a:ln>
+            <a:noFill/>
+          </a:ln>
+        </p:spPr>
+      </p:pic>
+      <p:sp>
+        <p:nvSpPr>
+          <p:cNvPr id="129" name="Google Shape;129;p14"/>
+          <p:cNvSpPr txBox="1"/>
+          <p:nvPr/>
+        </p:nvSpPr>
+        <p:spPr>
+          <a:xfrm>
+            <a:off x="4753175" y="3032450"/>
+            <a:ext cx="2044200" cy="393600"/>
+          </a:xfrm>
+          <a:prstGeom prst="rect">
+            <a:avLst/>
+          </a:prstGeom>
+          <a:noFill/>
+          <a:ln>
+            <a:noFill/>
+          </a:ln>
+        </p:spPr>
+        <p:txBody>
+          <a:bodyPr anchorCtr="0" anchor="t" bIns="91425" lIns="91425" spcFirstLastPara="1" rIns="91425" wrap="square" tIns="91425">
+            <a:noAutofit/>
+          </a:bodyPr>
+          <a:lstStyle/>
+          <a:p>
+            <a:pPr indent="0" lvl="0" marL="0" rtl="0" algn="ctr">
+              <a:spcBef>
+                <a:spcPts val="0"/>
+              </a:spcBef>
+              <a:spcAft>
+                <a:spcPts val="0"/>
+              </a:spcAft>
+              <a:buNone/>
+            </a:pPr>
+            <a:r>
+              <a:rPr b="1" lang="it" sz="1800">
+                <a:latin typeface="Montserrat"/>
+                <a:ea typeface="Montserrat"/>
+                <a:cs typeface="Montserrat"/>
+                <a:sym typeface="Montserrat"/>
+              </a:rPr>
+              <a:t>15 Mins</a:t>
+            </a:r>
+            <a:endParaRPr b="1" sz="1800">
+              <a:latin typeface="Montserrat"/>
+              <a:ea typeface="Montserrat"/>
+              <a:cs typeface="Montserrat"/>
+              <a:sym typeface="Montserrat"/>
+            </a:endParaRPr>
+          </a:p>
+        </p:txBody>
+      </p:sp>
+    </p:spTree>
+  </p:cSld>
+  <p:clrMapOvr>
+    <a:masterClrMapping/>
+  </p:clrMapOvr>
+</p:sld>
+</file>
+
 <file path=ppt/theme/theme1.xml><?xml version="1.0" encoding="utf-8"?>
+<a:theme xmlns:a="http://schemas.openxmlformats.org/drawingml/2006/main" xmlns:r="http://schemas.openxmlformats.org/officeDocument/2006/relationships" name="Simple Light">
+  <a:themeElements>
+    <a:clrScheme name="Simple Light">
+      <a:dk1>
+        <a:srgbClr val="000000"/>
+      </a:dk1>
+      <a:lt1>
+        <a:srgbClr val="FFFFFF"/>
+      </a:lt1>
+      <a:dk2>
+        <a:srgbClr val="595959"/>
+      </a:dk2>
+      <a:lt2>
+        <a:srgbClr val="EEEEEE"/>
+      </a:lt2>
+      <a:accent1>
+        <a:srgbClr val="4285F4"/>
+      </a:accent1>
+      <a:accent2>
+        <a:srgbClr val="212121"/>
+      </a:accent2>
+      <a:accent3>
+        <a:srgbClr val="78909C"/>
+      </a:accent3>
+      <a:accent4>
+        <a:srgbClr val="FFAB40"/>
+      </a:accent4>
+      <a:accent5>
+        <a:srgbClr val="0097A7"/>
+      </a:accent5>
+      <a:accent6>
+        <a:srgbClr val="EEFF41"/>
+      </a:accent6>
+      <a:hlink>
+        <a:srgbClr val="0097A7"/>
+      </a:hlink>
+      <a:folHlink>
+        <a:srgbClr val="0097A7"/>
+      </a:folHlink>
+    </a:clrScheme>
+    <a:fontScheme name="Office">
+      <a:majorFont>
+        <a:latin typeface="Arial"/>
+        <a:ea typeface=""/>
+        <a:cs typeface=""/>
+        <a:font script="Jpan" typeface="ＭＳ Ｐゴシック"/>
+        <a:font script="Hang" typeface="맑은 고딕"/>
+        <a:font script="Hans" typeface="宋体"/>
+        <a:font script="Hant" typeface="新細明體"/>
+        <a:font script="Arab" typeface="Times New Roman"/>
+        <a:font script="Hebr" typeface="Times New Roman"/>
+        <a:font script="Thai" typeface="Angsana New"/>
+        <a:font script="Ethi" typeface="Nyala"/>
+        <a:font script="Beng" typeface="Vrinda"/>
+        <a:font script="Gujr" typeface="Shruti"/>
+        <a:font script="Khmr" typeface="MoolBoran"/>
+        <a:font script="Knda" typeface="Tunga"/>
+        <a:font script="Guru" typeface="Raavi"/>
+        <a:font script="Cans" typeface="Euphemia"/>
+        <a:font script="Cher" typeface="Plantagenet Cherokee"/>
+        <a:font script="Yiii" typeface="Microsoft Yi Baiti"/>
+        <a:font script="Tibt" typeface="Microsoft Himalaya"/>
+        <a:font script="Thaa" typeface="MV Boli"/>
+        <a:font script="Deva" typeface="Mangal"/>
+        <a:font script="Telu" typeface="Gautami"/>
+        <a:font script="Taml" typeface="Latha"/>
+        <a:font script="Syrc" typeface="Estrangelo Edessa"/>
+        <a:font script="Orya" typeface="Kalinga"/>
+        <a:font script="Mlym" typeface="Kartika"/>
+        <a:font script="Laoo" typeface="DokChampa"/>
+        <a:font script="Sinh" typeface="Iskoola Pota"/>
+        <a:font script="Mong" typeface="Mongolian Baiti"/>
+        <a:font script="Viet" typeface="Times New Roman"/>
+        <a:font script="Uigh" typeface="Microsoft Uighur"/>
+        <a:font script="Geor" typeface="Sylfaen"/>
+      </a:majorFont>
+      <a:minorFont>
+        <a:latin typeface="Arial"/>
+        <a:ea typeface=""/>
+        <a:cs typeface=""/>
+        <a:font script="Jpan" typeface="ＭＳ Ｐゴシック"/>
+        <a:font script="Hang" typeface="맑은 고딕"/>
+        <a:font script="Hans" typeface="宋体"/>
+        <a:font script="Hant" typeface="新細明體"/>
+        <a:font script="Arab" typeface="Arial"/>
+        <a:font script="Hebr" typeface="Arial"/>
+        <a:font script="Thai" typeface="Cordia New"/>
+        <a:font script="Ethi" typeface="Nyala"/>
+        <a:font script="Beng" typeface="Vrinda"/>
+        <a:font script="Gujr" typeface="Shruti"/>
+        <a:font script="Khmr" typeface="DaunPenh"/>
+        <a:font script="Knda" typeface="Tunga"/>
+        <a:font script="Guru" typeface="Raavi"/>
+        <a:font script="Cans" typeface="Euphemia"/>
+        <a:font script="Cher" typeface="Plantagenet Cherokee"/>
+        <a:font script="Yiii" typeface="Microsoft Yi Baiti"/>
+        <a:font script="Tibt" typeface="Microsoft Himalaya"/>
+        <a:font script="Thaa" typeface="MV Boli"/>
+        <a:font script="Deva" typeface="Mangal"/>
+        <a:font script="Telu" typeface="Gautami"/>
+        <a:font script="Taml" typeface="Latha"/>
+        <a:font script="Syrc" typeface="Estrangelo Edessa"/>
+        <a:font script="Orya" typeface="Kalinga"/>
+        <a:font script="Mlym" typeface="Kartika"/>
+        <a:font script="Laoo" typeface="DokChampa"/>
+        <a:font script="Sinh" typeface="Iskoola Pota"/>
+        <a:font script="Mong" typeface="Mongolian Baiti"/>
+        <a:font script="Viet" typeface="Arial"/>
+        <a:font script="Uigh" typeface="Microsoft Uighur"/>
+        <a:font script="Geor" typeface="Sylfaen"/>
+      </a:minorFont>
+    </a:fontScheme>
+    <a:fmtScheme name="Office">
+      <a:fillStyleLst>
+        <a:solidFill>
+          <a:schemeClr val="phClr"/>
+        </a:solidFill>
+        <a:gradFill rotWithShape="1">
+          <a:gsLst>
+            <a:gs pos="0">
+              <a:schemeClr val="phClr">
+                <a:tint val="50000"/>
+                <a:satMod val="300000"/>
+              </a:schemeClr>
+            </a:gs>
+            <a:gs pos="35000">
+              <a:schemeClr val="phClr">
+                <a:tint val="37000"/>
+                <a:satMod val="300000"/>
+              </a:schemeClr>
+            </a:gs>
+            <a:gs pos="100000">
+              <a:schemeClr val="phClr">
+                <a:tint val="15000"/>
+                <a:satMod val="350000"/>
+              </a:schemeClr>
+            </a:gs>
+          </a:gsLst>
+          <a:lin ang="16200000" scaled="1"/>
+        </a:gradFill>
+        <a:gradFill rotWithShape="1">
+          <a:gsLst>
+            <a:gs pos="0">
+              <a:schemeClr val="phClr">
+                <a:tint val="100000"/>
+                <a:shade val="100000"/>
+                <a:satMod val="130000"/>
+              </a:schemeClr>
+            </a:gs>
+            <a:gs pos="100000">
+              <a:schemeClr val="phClr">
+                <a:tint val="50000"/>
+                <a:shade val="100000"/>
+                <a:satMod val="350000"/>
+              </a:schemeClr>
+            </a:gs>
+          </a:gsLst>
+          <a:lin ang="16200000" scaled="0"/>
+        </a:gradFill>
+      </a:fillStyleLst>
+      <a:lnStyleLst>
+        <a:ln w="9525" cap="flat" cmpd="sng" algn="ctr">
+          <a:solidFill>
+            <a:schemeClr val="phClr">
+              <a:shade val="95000"/>
+              <a:satMod val="105000"/>
+            </a:schemeClr>
+          </a:solidFill>
+          <a:prstDash val="solid"/>
+        </a:ln>
+        <a:ln w="25400" cap="flat" cmpd="sng" algn="ctr">
+          <a:solidFill>
+            <a:schemeClr val="phClr"/>
+          </a:solidFill>
+          <a:prstDash val="solid"/>
+        </a:ln>
+        <a:ln w="38100" cap="flat" cmpd="sng" algn="ctr">
+          <a:solidFill>
+            <a:schemeClr val="phClr"/>
+          </a:solidFill>
+          <a:prstDash val="solid"/>
+        </a:ln>
+      </a:lnStyleLst>
+      <a:effectStyleLst>
+        <a:effectStyle>
+          <a:effectLst>
+            <a:outerShdw blurRad="40000" dist="20000" dir="5400000" rotWithShape="0">
+              <a:srgbClr val="000000">
+                <a:alpha val="38000"/>
+              </a:srgbClr>
+            </a:outerShdw>
+          </a:effectLst>
+        </a:effectStyle>
+        <a:effectStyle>
+          <a:effectLst>
+            <a:outerShdw blurRad="40000" dist="23000" dir="5400000" rotWithShape="0">
+              <a:srgbClr val="000000">
+                <a:alpha val="35000"/>
+              </a:srgbClr>
+            </a:outerShdw>
+          </a:effectLst>
+        </a:effectStyle>
+        <a:effectStyle>
+          <a:effectLst>
+            <a:outerShdw blurRad="40000" dist="23000" dir="5400000" rotWithShape="0">
+              <a:srgbClr val="000000">
+                <a:alpha val="35000"/>
+              </a:srgbClr>
+            </a:outerShdw>
+          </a:effectLst>
+          <a:scene3d>
+            <a:camera prst="orthographicFront">
+              <a:rot lat="0" lon="0" rev="0"/>
+            </a:camera>
+            <a:lightRig rig="threePt" dir="t">
+              <a:rot lat="0" lon="0" rev="1200000"/>
+            </a:lightRig>
+          </a:scene3d>
+          <a:sp3d>
+            <a:bevelT w="63500" h="25400"/>
+          </a:sp3d>
+        </a:effectStyle>
+      </a:effectStyleLst>
+      <a:bgFillStyleLst>
+        <a:solidFill>
+          <a:schemeClr val="phClr"/>
+        </a:solidFill>
+        <a:gradFill rotWithShape="1">
+          <a:gsLst>
+            <a:gs pos="0">
+              <a:schemeClr val="phClr">
+                <a:tint val="40000"/>
+                <a:satMod val="350000"/>
+              </a:schemeClr>
+            </a:gs>
+            <a:gs pos="40000">
+              <a:schemeClr val="phClr">
+                <a:tint val="45000"/>
+                <a:shade val="99000"/>
+                <a:satMod val="350000"/>
+              </a:schemeClr>
+            </a:gs>
+            <a:gs pos="100000">
+              <a:schemeClr val="phClr">
+                <a:shade val="20000"/>
+                <a:satMod val="255000"/>
+              </a:schemeClr>
+            </a:gs>
+          </a:gsLst>
+          <a:path path="circle">
+            <a:fillToRect l="50000" t="-80000" r="50000" b="180000"/>
+          </a:path>
+        </a:gradFill>
+        <a:gradFill rotWithShape="1">
+          <a:gsLst>
+            <a:gs pos="0">
+              <a:schemeClr val="phClr">
+                <a:tint val="80000"/>
+                <a:satMod val="300000"/>
+              </a:schemeClr>
+            </a:gs>
+            <a:gs pos="100000">
+              <a:schemeClr val="phClr">
+                <a:shade val="30000"/>
+                <a:satMod val="200000"/>
+              </a:schemeClr>
+            </a:gs>
+          </a:gsLst>
+          <a:path path="circle">
+            <a:fillToRect l="50000" t="50000" r="50000" b="50000"/>
+          </a:path>
+        </a:gradFill>
+      </a:bgFillStyleLst>
+    </a:fmtScheme>
+  </a:themeElements>
+</a:theme>
+</file>
+
+<file path=ppt/theme/theme2.xml><?xml version="1.0" encoding="utf-8"?>
 <a:theme xmlns:a="http://schemas.openxmlformats.org/drawingml/2006/main" xmlns:r="http://schemas.openxmlformats.org/officeDocument/2006/relationships">
   <a:themeElements>
     <a:clrScheme name="Default">
@@ -7178,283 +9356,4 @@
     </a:fmtScheme>
   </a:themeElements>
 </a:theme>
-</file>
-
-<file path=ppt/theme/theme2.xml><?xml version="1.0" encoding="utf-8"?>
-<a:theme xmlns:a="http://schemas.openxmlformats.org/drawingml/2006/main" xmlns:r="http://schemas.openxmlformats.org/officeDocument/2006/relationships" name="Simple Light">
-  <a:themeElements>
-    <a:clrScheme name="Simple Light">
-      <a:dk1>
-        <a:srgbClr val="000000"/>
-      </a:dk1>
-      <a:lt1>
-        <a:srgbClr val="FFFFFF"/>
-      </a:lt1>
-      <a:dk2>
-        <a:srgbClr val="595959"/>
-      </a:dk2>
-      <a:lt2>
-        <a:srgbClr val="EEEEEE"/>
-      </a:lt2>
-      <a:accent1>
-        <a:srgbClr val="4285F4"/>
-      </a:accent1>
-      <a:accent2>
-        <a:srgbClr val="212121"/>
-      </a:accent2>
-      <a:accent3>
-        <a:srgbClr val="78909C"/>
-      </a:accent3>
-      <a:accent4>
-        <a:srgbClr val="FFAB40"/>
-      </a:accent4>
-      <a:accent5>
-        <a:srgbClr val="0097A7"/>
-      </a:accent5>
-      <a:accent6>
-        <a:srgbClr val="EEFF41"/>
-      </a:accent6>
-      <a:hlink>
-        <a:srgbClr val="0097A7"/>
-      </a:hlink>
-      <a:folHlink>
-        <a:srgbClr val="0097A7"/>
-      </a:folHlink>
-    </a:clrScheme>
-    <a:fontScheme name="Office">
-      <a:majorFont>
-        <a:latin typeface="Arial"/>
-        <a:ea typeface=""/>
-        <a:cs typeface=""/>
-        <a:font script="Jpan" typeface="ＭＳ Ｐゴシック"/>
-        <a:font script="Hang" typeface="맑은 고딕"/>
-        <a:font script="Hans" typeface="宋体"/>
-        <a:font script="Hant" typeface="新細明體"/>
-        <a:font script="Arab" typeface="Times New Roman"/>
-        <a:font script="Hebr" typeface="Times New Roman"/>
-        <a:font script="Thai" typeface="Angsana New"/>
-        <a:font script="Ethi" typeface="Nyala"/>
-        <a:font script="Beng" typeface="Vrinda"/>
-        <a:font script="Gujr" typeface="Shruti"/>
-        <a:font script="Khmr" typeface="MoolBoran"/>
-        <a:font script="Knda" typeface="Tunga"/>
-        <a:font script="Guru" typeface="Raavi"/>
-        <a:font script="Cans" typeface="Euphemia"/>
-        <a:font script="Cher" typeface="Plantagenet Cherokee"/>
-        <a:font script="Yiii" typeface="Microsoft Yi Baiti"/>
-        <a:font script="Tibt" typeface="Microsoft Himalaya"/>
-        <a:font script="Thaa" typeface="MV Boli"/>
-        <a:font script="Deva" typeface="Mangal"/>
-        <a:font script="Telu" typeface="Gautami"/>
-        <a:font script="Taml" typeface="Latha"/>
-        <a:font script="Syrc" typeface="Estrangelo Edessa"/>
-        <a:font script="Orya" typeface="Kalinga"/>
-        <a:font script="Mlym" typeface="Kartika"/>
-        <a:font script="Laoo" typeface="DokChampa"/>
-        <a:font script="Sinh" typeface="Iskoola Pota"/>
-        <a:font script="Mong" typeface="Mongolian Baiti"/>
-        <a:font script="Viet" typeface="Times New Roman"/>
-        <a:font script="Uigh" typeface="Microsoft Uighur"/>
-        <a:font script="Geor" typeface="Sylfaen"/>
-      </a:majorFont>
-      <a:minorFont>
-        <a:latin typeface="Arial"/>
-        <a:ea typeface=""/>
-        <a:cs typeface=""/>
-        <a:font script="Jpan" typeface="ＭＳ Ｐゴシック"/>
-        <a:font script="Hang" typeface="맑은 고딕"/>
-        <a:font script="Hans" typeface="宋体"/>
-        <a:font script="Hant" typeface="新細明體"/>
-        <a:font script="Arab" typeface="Arial"/>
-        <a:font script="Hebr" typeface="Arial"/>
-        <a:font script="Thai" typeface="Cordia New"/>
-        <a:font script="Ethi" typeface="Nyala"/>
-        <a:font script="Beng" typeface="Vrinda"/>
-        <a:font script="Gujr" typeface="Shruti"/>
-        <a:font script="Khmr" typeface="DaunPenh"/>
-        <a:font script="Knda" typeface="Tunga"/>
-        <a:font script="Guru" typeface="Raavi"/>
-        <a:font script="Cans" typeface="Euphemia"/>
-        <a:font script="Cher" typeface="Plantagenet Cherokee"/>
-        <a:font script="Yiii" typeface="Microsoft Yi Baiti"/>
-        <a:font script="Tibt" typeface="Microsoft Himalaya"/>
-        <a:font script="Thaa" typeface="MV Boli"/>
-        <a:font script="Deva" typeface="Mangal"/>
-        <a:font script="Telu" typeface="Gautami"/>
-        <a:font script="Taml" typeface="Latha"/>
-        <a:font script="Syrc" typeface="Estrangelo Edessa"/>
-        <a:font script="Orya" typeface="Kalinga"/>
-        <a:font script="Mlym" typeface="Kartika"/>
-        <a:font script="Laoo" typeface="DokChampa"/>
-        <a:font script="Sinh" typeface="Iskoola Pota"/>
-        <a:font script="Mong" typeface="Mongolian Baiti"/>
-        <a:font script="Viet" typeface="Arial"/>
-        <a:font script="Uigh" typeface="Microsoft Uighur"/>
-        <a:font script="Geor" typeface="Sylfaen"/>
-      </a:minorFont>
-    </a:fontScheme>
-    <a:fmtScheme name="Office">
-      <a:fillStyleLst>
-        <a:solidFill>
-          <a:schemeClr val="phClr"/>
-        </a:solidFill>
-        <a:gradFill rotWithShape="1">
-          <a:gsLst>
-            <a:gs pos="0">
-              <a:schemeClr val="phClr">
-                <a:tint val="50000"/>
-                <a:satMod val="300000"/>
-              </a:schemeClr>
-            </a:gs>
-            <a:gs pos="35000">
-              <a:schemeClr val="phClr">
-                <a:tint val="37000"/>
-                <a:satMod val="300000"/>
-              </a:schemeClr>
-            </a:gs>
-            <a:gs pos="100000">
-              <a:schemeClr val="phClr">
-                <a:tint val="15000"/>
-                <a:satMod val="350000"/>
-              </a:schemeClr>
-            </a:gs>
-          </a:gsLst>
-          <a:lin ang="16200000" scaled="1"/>
-        </a:gradFill>
-        <a:gradFill rotWithShape="1">
-          <a:gsLst>
-            <a:gs pos="0">
-              <a:schemeClr val="phClr">
-                <a:tint val="100000"/>
-                <a:shade val="100000"/>
-                <a:satMod val="130000"/>
-              </a:schemeClr>
-            </a:gs>
-            <a:gs pos="100000">
-              <a:schemeClr val="phClr">
-                <a:tint val="50000"/>
-                <a:shade val="100000"/>
-                <a:satMod val="350000"/>
-              </a:schemeClr>
-            </a:gs>
-          </a:gsLst>
-          <a:lin ang="16200000" scaled="0"/>
-        </a:gradFill>
-      </a:fillStyleLst>
-      <a:lnStyleLst>
-        <a:ln w="9525" cap="flat" cmpd="sng" algn="ctr">
-          <a:solidFill>
-            <a:schemeClr val="phClr">
-              <a:shade val="95000"/>
-              <a:satMod val="105000"/>
-            </a:schemeClr>
-          </a:solidFill>
-          <a:prstDash val="solid"/>
-        </a:ln>
-        <a:ln w="25400" cap="flat" cmpd="sng" algn="ctr">
-          <a:solidFill>
-            <a:schemeClr val="phClr"/>
-          </a:solidFill>
-          <a:prstDash val="solid"/>
-        </a:ln>
-        <a:ln w="38100" cap="flat" cmpd="sng" algn="ctr">
-          <a:solidFill>
-            <a:schemeClr val="phClr"/>
-          </a:solidFill>
-          <a:prstDash val="solid"/>
-        </a:ln>
-      </a:lnStyleLst>
-      <a:effectStyleLst>
-        <a:effectStyle>
-          <a:effectLst>
-            <a:outerShdw blurRad="40000" dist="20000" dir="5400000" rotWithShape="0">
-              <a:srgbClr val="000000">
-                <a:alpha val="38000"/>
-              </a:srgbClr>
-            </a:outerShdw>
-          </a:effectLst>
-        </a:effectStyle>
-        <a:effectStyle>
-          <a:effectLst>
-            <a:outerShdw blurRad="40000" dist="23000" dir="5400000" rotWithShape="0">
-              <a:srgbClr val="000000">
-                <a:alpha val="35000"/>
-              </a:srgbClr>
-            </a:outerShdw>
-          </a:effectLst>
-        </a:effectStyle>
-        <a:effectStyle>
-          <a:effectLst>
-            <a:outerShdw blurRad="40000" dist="23000" dir="5400000" rotWithShape="0">
-              <a:srgbClr val="000000">
-                <a:alpha val="35000"/>
-              </a:srgbClr>
-            </a:outerShdw>
-          </a:effectLst>
-          <a:scene3d>
-            <a:camera prst="orthographicFront">
-              <a:rot lat="0" lon="0" rev="0"/>
-            </a:camera>
-            <a:lightRig rig="threePt" dir="t">
-              <a:rot lat="0" lon="0" rev="1200000"/>
-            </a:lightRig>
-          </a:scene3d>
-          <a:sp3d>
-            <a:bevelT w="63500" h="25400"/>
-          </a:sp3d>
-        </a:effectStyle>
-      </a:effectStyleLst>
-      <a:bgFillStyleLst>
-        <a:solidFill>
-          <a:schemeClr val="phClr"/>
-        </a:solidFill>
-        <a:gradFill rotWithShape="1">
-          <a:gsLst>
-            <a:gs pos="0">
-              <a:schemeClr val="phClr">
-                <a:tint val="40000"/>
-                <a:satMod val="350000"/>
-              </a:schemeClr>
-            </a:gs>
-            <a:gs pos="40000">
-              <a:schemeClr val="phClr">
-                <a:tint val="45000"/>
-                <a:shade val="99000"/>
-                <a:satMod val="350000"/>
-              </a:schemeClr>
-            </a:gs>
-            <a:gs pos="100000">
-              <a:schemeClr val="phClr">
-                <a:shade val="20000"/>
-                <a:satMod val="255000"/>
-              </a:schemeClr>
-            </a:gs>
-          </a:gsLst>
-          <a:path path="circle">
-            <a:fillToRect l="50000" t="-80000" r="50000" b="180000"/>
-          </a:path>
-        </a:gradFill>
-        <a:gradFill rotWithShape="1">
-          <a:gsLst>
-            <a:gs pos="0">
-              <a:schemeClr val="phClr">
-                <a:tint val="80000"/>
-                <a:satMod val="300000"/>
-              </a:schemeClr>
-            </a:gs>
-            <a:gs pos="100000">
-              <a:schemeClr val="phClr">
-                <a:shade val="30000"/>
-                <a:satMod val="200000"/>
-              </a:schemeClr>
-            </a:gs>
-          </a:gsLst>
-          <a:path path="circle">
-            <a:fillToRect l="50000" t="50000" r="50000" b="50000"/>
-          </a:path>
-        </a:gradFill>
-      </a:bgFillStyleLst>
-    </a:fmtScheme>
-  </a:themeElements>
-</a:theme>
 </file>
</xml_diff>